<commit_message>
L12 - added homework
</commit_message>
<xml_diff>
--- a/Lectures/Lesson 12 - Reflection API, Annotations.pptx
+++ b/Lectures/Lesson 12 - Reflection API, Annotations.pptx
@@ -5,7 +5,7 @@
     <p:sldMasterId id="2147483658" r:id="rId1"/>
   </p:sldMasterIdLst>
   <p:notesMasterIdLst>
-    <p:notesMasterId r:id="rId35"/>
+    <p:notesMasterId r:id="rId36"/>
   </p:notesMasterIdLst>
   <p:sldIdLst>
     <p:sldId id="284" r:id="rId2"/>
@@ -39,25 +39,26 @@
     <p:sldId id="460" r:id="rId30"/>
     <p:sldId id="461" r:id="rId31"/>
     <p:sldId id="434" r:id="rId32"/>
-    <p:sldId id="401" r:id="rId33"/>
-    <p:sldId id="339" r:id="rId34"/>
+    <p:sldId id="462" r:id="rId33"/>
+    <p:sldId id="401" r:id="rId34"/>
+    <p:sldId id="339" r:id="rId35"/>
   </p:sldIdLst>
   <p:sldSz cx="9144000" cy="5143500" type="screen16x9"/>
   <p:notesSz cx="6858000" cy="9144000"/>
   <p:embeddedFontLst>
     <p:embeddedFont>
-      <p:font typeface="Lato" panose="020F0502020204030203" pitchFamily="34" charset="0"/>
-      <p:regular r:id="rId36"/>
-      <p:bold r:id="rId37"/>
-      <p:italic r:id="rId38"/>
-      <p:boldItalic r:id="rId39"/>
+      <p:font typeface="Lato" panose="020B0604020202020204" charset="0"/>
+      <p:regular r:id="rId37"/>
+      <p:bold r:id="rId38"/>
+      <p:italic r:id="rId39"/>
+      <p:boldItalic r:id="rId40"/>
     </p:embeddedFont>
     <p:embeddedFont>
       <p:font typeface="Raleway" panose="020B0604020202020204" charset="0"/>
-      <p:regular r:id="rId40"/>
-      <p:bold r:id="rId41"/>
-      <p:italic r:id="rId42"/>
-      <p:boldItalic r:id="rId43"/>
+      <p:regular r:id="rId41"/>
+      <p:bold r:id="rId42"/>
+      <p:italic r:id="rId43"/>
+      <p:boldItalic r:id="rId44"/>
     </p:embeddedFont>
   </p:embeddedFontLst>
   <p:defaultTextStyle>
@@ -15334,7 +15335,103 @@
                 <a:spcPct val="150000"/>
               </a:lnSpc>
             </a:pPr>
-            <a:endParaRPr lang="en-US" sz="2000" dirty="0"/>
+            <a:r>
+              <a:rPr lang="en-US" sz="1050" dirty="0"/>
+              <a:t>Implement your own annotations: </a:t>
+            </a:r>
+          </a:p>
+          <a:p>
+            <a:pPr lvl="1">
+              <a:lnSpc>
+                <a:spcPct val="150000"/>
+              </a:lnSpc>
+            </a:pPr>
+            <a:r>
+              <a:rPr lang="en-US" sz="1050" b="1" i="1" dirty="0"/>
+              <a:t>@Codec(algorithm = </a:t>
+            </a:r>
+            <a:r>
+              <a:rPr lang="en-US" sz="1050" b="1" i="1" dirty="0" err="1"/>
+              <a:t>Algorithms.MORSE</a:t>
+            </a:r>
+            <a:r>
+              <a:rPr lang="en-US" sz="1050" b="1" i="1" dirty="0"/>
+              <a:t>/</a:t>
+            </a:r>
+            <a:r>
+              <a:rPr lang="en-US" sz="1050" b="1" i="1" dirty="0" err="1"/>
+              <a:t>Algorithms.CAESAR</a:t>
+            </a:r>
+            <a:r>
+              <a:rPr lang="en-US" sz="1050" b="1" i="1" dirty="0"/>
+              <a:t>/…) </a:t>
+            </a:r>
+            <a:r>
+              <a:rPr lang="en-US" sz="1050" dirty="0"/>
+              <a:t>– add this annotation to all codec classes with algorithm name specified</a:t>
+            </a:r>
+          </a:p>
+          <a:p>
+            <a:pPr lvl="1">
+              <a:lnSpc>
+                <a:spcPct val="150000"/>
+              </a:lnSpc>
+            </a:pPr>
+            <a:r>
+              <a:rPr lang="en-US" sz="1050" b="1" i="1" dirty="0"/>
+              <a:t>@Key – </a:t>
+            </a:r>
+            <a:r>
+              <a:rPr lang="en-US" sz="1050" dirty="0"/>
+              <a:t>(can be applied for </a:t>
+            </a:r>
+            <a:r>
+              <a:rPr lang="en-US" sz="1050" dirty="0" err="1"/>
+              <a:t>Vigenere</a:t>
+            </a:r>
+            <a:r>
+              <a:rPr lang="en-US" sz="1050" dirty="0"/>
+              <a:t> only)</a:t>
+            </a:r>
+            <a:endParaRPr lang="en-US" sz="1050" b="1" i="1" dirty="0"/>
+          </a:p>
+          <a:p>
+            <a:pPr lvl="1">
+              <a:lnSpc>
+                <a:spcPct val="150000"/>
+              </a:lnSpc>
+            </a:pPr>
+            <a:r>
+              <a:rPr lang="en-US" sz="1050" b="1" i="1" dirty="0"/>
+              <a:t>@Alphabet</a:t>
+            </a:r>
+            <a:r>
+              <a:rPr lang="en-US" sz="1050" dirty="0"/>
+              <a:t> - (can be applied for </a:t>
+            </a:r>
+            <a:r>
+              <a:rPr lang="en-US" sz="1050" dirty="0" err="1"/>
+              <a:t>Vigenere</a:t>
+            </a:r>
+            <a:r>
+              <a:rPr lang="en-US" sz="1050" dirty="0"/>
+              <a:t>, Caesar)</a:t>
+            </a:r>
+          </a:p>
+          <a:p>
+            <a:pPr lvl="1">
+              <a:lnSpc>
+                <a:spcPct val="150000"/>
+              </a:lnSpc>
+            </a:pPr>
+            <a:r>
+              <a:rPr lang="en-US" sz="1050" b="1" i="1" dirty="0"/>
+              <a:t>@Shift - </a:t>
+            </a:r>
+            <a:r>
+              <a:rPr lang="en-US" sz="1050" dirty="0"/>
+              <a:t>(can be applied for Caesar only)</a:t>
+            </a:r>
           </a:p>
         </p:txBody>
       </p:sp>
@@ -15462,6 +15559,389 @@
 </file>
 
 <file path=ppt/slides/slide32.xml><?xml version="1.0" encoding="utf-8"?>
+<p:sld xmlns:a="http://schemas.openxmlformats.org/drawingml/2006/main" xmlns:r="http://schemas.openxmlformats.org/officeDocument/2006/relationships" xmlns:p="http://schemas.openxmlformats.org/presentationml/2006/main">
+  <p:cSld>
+    <p:spTree>
+      <p:nvGrpSpPr>
+        <p:cNvPr id="1" name=""/>
+        <p:cNvGrpSpPr/>
+        <p:nvPr/>
+      </p:nvGrpSpPr>
+      <p:grpSpPr>
+        <a:xfrm>
+          <a:off x="0" y="0"/>
+          <a:ext cx="0" cy="0"/>
+          <a:chOff x="0" y="0"/>
+          <a:chExt cx="0" cy="0"/>
+        </a:xfrm>
+      </p:grpSpPr>
+      <p:sp>
+        <p:nvSpPr>
+          <p:cNvPr id="2" name="Заголовок 1"/>
+          <p:cNvSpPr>
+            <a:spLocks noGrp="1"/>
+          </p:cNvSpPr>
+          <p:nvPr>
+            <p:ph type="title"/>
+          </p:nvPr>
+        </p:nvSpPr>
+        <p:spPr/>
+        <p:txBody>
+          <a:bodyPr/>
+          <a:lstStyle/>
+          <a:p>
+            <a:r>
+              <a:rPr lang="en-US" sz="2400" dirty="0"/>
+              <a:t>Homework</a:t>
+            </a:r>
+            <a:endParaRPr lang="ru-RU" sz="2400" dirty="0"/>
+          </a:p>
+        </p:txBody>
+      </p:sp>
+      <p:sp>
+        <p:nvSpPr>
+          <p:cNvPr id="5" name="Місце для тексту 4">
+            <a:extLst>
+              <a:ext uri="{FF2B5EF4-FFF2-40B4-BE49-F238E27FC236}">
+                <a16:creationId xmlns:a16="http://schemas.microsoft.com/office/drawing/2014/main" id="{9D72D2AD-9CD4-4F1E-B739-FC83B5BCFB12}"/>
+              </a:ext>
+            </a:extLst>
+          </p:cNvPr>
+          <p:cNvSpPr>
+            <a:spLocks noGrp="1"/>
+          </p:cNvSpPr>
+          <p:nvPr>
+            <p:ph type="body" idx="1"/>
+          </p:nvPr>
+        </p:nvSpPr>
+        <p:spPr/>
+        <p:txBody>
+          <a:bodyPr/>
+          <a:lstStyle/>
+          <a:p>
+            <a:pPr>
+              <a:lnSpc>
+                <a:spcPct val="150000"/>
+              </a:lnSpc>
+            </a:pPr>
+            <a:r>
+              <a:rPr lang="en-US" sz="1050" dirty="0"/>
+              <a:t>Change implementation of </a:t>
+            </a:r>
+            <a:r>
+              <a:rPr lang="en-US" sz="1050" dirty="0" err="1"/>
+              <a:t>DecodersFactory</a:t>
+            </a:r>
+            <a:r>
+              <a:rPr lang="en-US" sz="1050" dirty="0"/>
+              <a:t> and </a:t>
+            </a:r>
+            <a:r>
+              <a:rPr lang="en-US" sz="1050" dirty="0" err="1"/>
+              <a:t>EncodersFactory</a:t>
+            </a:r>
+            <a:r>
+              <a:rPr lang="en-US" sz="1050" dirty="0"/>
+              <a:t>:</a:t>
+            </a:r>
+          </a:p>
+          <a:p>
+            <a:pPr lvl="1">
+              <a:lnSpc>
+                <a:spcPct val="150000"/>
+              </a:lnSpc>
+            </a:pPr>
+            <a:r>
+              <a:rPr lang="en-US" sz="1050" dirty="0"/>
+              <a:t>Remove switch statement</a:t>
+            </a:r>
+          </a:p>
+          <a:p>
+            <a:pPr lvl="1">
+              <a:lnSpc>
+                <a:spcPct val="150000"/>
+              </a:lnSpc>
+            </a:pPr>
+            <a:r>
+              <a:rPr lang="en-US" sz="1050" dirty="0"/>
+              <a:t>Find class marked by </a:t>
+            </a:r>
+            <a:r>
+              <a:rPr lang="en-US" sz="1050" b="1" i="1" dirty="0"/>
+              <a:t>@Codec </a:t>
+            </a:r>
+            <a:r>
+              <a:rPr lang="en-US" sz="1050" i="1" dirty="0"/>
+              <a:t>annotation with </a:t>
+            </a:r>
+            <a:r>
+              <a:rPr lang="en-US" sz="1050" b="1" i="1" dirty="0"/>
+              <a:t>algorithm = {specified algorithm} </a:t>
+            </a:r>
+            <a:r>
+              <a:rPr lang="en-US" sz="1050" dirty="0"/>
+              <a:t>and implements Decoder/Encoder interface using Reflection API</a:t>
+            </a:r>
+          </a:p>
+          <a:p>
+            <a:pPr lvl="1">
+              <a:lnSpc>
+                <a:spcPct val="150000"/>
+              </a:lnSpc>
+            </a:pPr>
+            <a:r>
+              <a:rPr lang="en-US" sz="1050" dirty="0"/>
+              <a:t>Create instance of found class by no-</a:t>
+            </a:r>
+            <a:r>
+              <a:rPr lang="en-US" sz="1050" dirty="0" err="1"/>
+              <a:t>arg</a:t>
+            </a:r>
+            <a:r>
+              <a:rPr lang="en-US" sz="1050" dirty="0"/>
+              <a:t> constructor using Reflection API</a:t>
+            </a:r>
+          </a:p>
+          <a:p>
+            <a:pPr lvl="1">
+              <a:lnSpc>
+                <a:spcPct val="150000"/>
+              </a:lnSpc>
+            </a:pPr>
+            <a:r>
+              <a:rPr lang="en-US" sz="1050" dirty="0"/>
+              <a:t>Set values of key/alphabet/shift (where appliable) from properties using Reflection API (key/alphabet/shift should be marked by appropriate annotation)</a:t>
+            </a:r>
+          </a:p>
+          <a:p>
+            <a:pPr lvl="1">
+              <a:lnSpc>
+                <a:spcPct val="150000"/>
+              </a:lnSpc>
+            </a:pPr>
+            <a:r>
+              <a:rPr lang="en-US" sz="1050" dirty="0"/>
+              <a:t>To determine which alphabet should be used use value from </a:t>
+            </a:r>
+            <a:r>
+              <a:rPr lang="en-US" sz="1050" b="1" i="1" dirty="0"/>
+              <a:t>@Codec </a:t>
+            </a:r>
+            <a:r>
+              <a:rPr lang="en-US" sz="1050" dirty="0"/>
+              <a:t>annotation</a:t>
+            </a:r>
+          </a:p>
+          <a:p>
+            <a:pPr lvl="1">
+              <a:lnSpc>
+                <a:spcPct val="150000"/>
+              </a:lnSpc>
+            </a:pPr>
+            <a:r>
+              <a:rPr lang="en-US" sz="1050" dirty="0"/>
+              <a:t>Throw exception in case annotation used incorrectly:</a:t>
+            </a:r>
+          </a:p>
+          <a:p>
+            <a:pPr lvl="2">
+              <a:lnSpc>
+                <a:spcPct val="150000"/>
+              </a:lnSpc>
+            </a:pPr>
+            <a:r>
+              <a:rPr lang="en-US" sz="1050" b="1" i="1" dirty="0"/>
+              <a:t>@Codec – </a:t>
+            </a:r>
+            <a:r>
+              <a:rPr lang="en-US" sz="1050" i="1" dirty="0"/>
+              <a:t>used for class that does not implements </a:t>
+            </a:r>
+            <a:r>
+              <a:rPr lang="en-US" sz="1050" dirty="0"/>
+              <a:t>Decoder/Encoder interface</a:t>
+            </a:r>
+          </a:p>
+          <a:p>
+            <a:pPr lvl="2">
+              <a:lnSpc>
+                <a:spcPct val="150000"/>
+              </a:lnSpc>
+            </a:pPr>
+            <a:r>
+              <a:rPr lang="en-US" sz="1050" b="1" i="1" dirty="0"/>
+              <a:t>@Key – </a:t>
+            </a:r>
+            <a:r>
+              <a:rPr lang="en-US" sz="1050" dirty="0"/>
+              <a:t>used for algorithm does not use key (for example: Caesar)</a:t>
+            </a:r>
+          </a:p>
+          <a:p>
+            <a:pPr lvl="2">
+              <a:lnSpc>
+                <a:spcPct val="150000"/>
+              </a:lnSpc>
+            </a:pPr>
+            <a:r>
+              <a:rPr lang="en-US" sz="1050" b="1" i="1" dirty="0"/>
+              <a:t>@Alphabet - </a:t>
+            </a:r>
+            <a:r>
+              <a:rPr lang="en-US" sz="1050" dirty="0"/>
+              <a:t>used for algorithm does not use alphabet (for example: VigenereX2)</a:t>
+            </a:r>
+            <a:endParaRPr lang="en-US" sz="1050" b="1" i="1" dirty="0"/>
+          </a:p>
+          <a:p>
+            <a:pPr lvl="2">
+              <a:lnSpc>
+                <a:spcPct val="150000"/>
+              </a:lnSpc>
+            </a:pPr>
+            <a:r>
+              <a:rPr lang="en-US" sz="1050" b="1" i="1" dirty="0"/>
+              <a:t>@Shift – </a:t>
+            </a:r>
+            <a:r>
+              <a:rPr lang="en-US" sz="1050" i="1" dirty="0"/>
+              <a:t>used for class that does use shift (for example: Morse)</a:t>
+            </a:r>
+          </a:p>
+          <a:p>
+            <a:pPr lvl="2">
+              <a:lnSpc>
+                <a:spcPct val="150000"/>
+              </a:lnSpc>
+            </a:pPr>
+            <a:endParaRPr lang="en-US" sz="1050" i="1" dirty="0"/>
+          </a:p>
+        </p:txBody>
+      </p:sp>
+      <p:sp>
+        <p:nvSpPr>
+          <p:cNvPr id="4" name="Rectangle 1"/>
+          <p:cNvSpPr>
+            <a:spLocks noChangeArrowheads="1"/>
+          </p:cNvSpPr>
+          <p:nvPr/>
+        </p:nvSpPr>
+        <p:spPr bwMode="auto">
+          <a:xfrm>
+            <a:off x="1" y="32951"/>
+            <a:ext cx="138564" cy="276999"/>
+          </a:xfrm>
+          <a:prstGeom prst="rect">
+            <a:avLst/>
+          </a:prstGeom>
+          <a:solidFill>
+            <a:srgbClr val="FFFFFF"/>
+          </a:solidFill>
+          <a:ln>
+            <a:noFill/>
+          </a:ln>
+          <a:effectLst/>
+          <a:extLst>
+            <a:ext uri="{91240B29-F687-4F45-9708-019B960494DF}">
+              <a14:hiddenLine xmlns:a14="http://schemas.microsoft.com/office/drawing/2010/main" w="9525">
+                <a:solidFill>
+                  <a:schemeClr val="tx1"/>
+                </a:solidFill>
+                <a:miter lim="800000"/>
+                <a:headEnd/>
+                <a:tailEnd/>
+              </a14:hiddenLine>
+            </a:ext>
+            <a:ext uri="{AF507438-7753-43E0-B8FC-AC1667EBCBE1}">
+              <a14:hiddenEffects xmlns:a14="http://schemas.microsoft.com/office/drawing/2010/main">
+                <a:effectLst>
+                  <a:outerShdw dist="35921" dir="2700000" algn="ctr" rotWithShape="0">
+                    <a:schemeClr val="bg2"/>
+                  </a:outerShdw>
+                </a:effectLst>
+              </a14:hiddenEffects>
+            </a:ext>
+          </a:extLst>
+        </p:spPr>
+        <p:txBody>
+          <a:bodyPr vert="horz" wrap="none" lIns="68580" tIns="34290" rIns="68580" bIns="34290" numCol="1" anchor="ctr" anchorCtr="0" compatLnSpc="1">
+            <a:prstTxWarp prst="textNoShape">
+              <a:avLst/>
+            </a:prstTxWarp>
+            <a:spAutoFit/>
+          </a:bodyPr>
+          <a:lstStyle/>
+          <a:p>
+            <a:pPr defTabSz="685800" eaLnBrk="0" fontAlgn="base" hangingPunct="0">
+              <a:spcBef>
+                <a:spcPct val="0"/>
+              </a:spcBef>
+              <a:spcAft>
+                <a:spcPct val="0"/>
+              </a:spcAft>
+              <a:buClrTx/>
+            </a:pPr>
+            <a:endParaRPr lang="ru-RU" altLang="ru-RU" sz="1350" dirty="0">
+              <a:solidFill>
+                <a:schemeClr val="tx1"/>
+              </a:solidFill>
+              <a:latin typeface="Arial" panose="020B0604020202020204" pitchFamily="34" charset="0"/>
+            </a:endParaRPr>
+          </a:p>
+        </p:txBody>
+      </p:sp>
+      <p:sp>
+        <p:nvSpPr>
+          <p:cNvPr id="3" name="Місце для номера слайда 2">
+            <a:extLst>
+              <a:ext uri="{FF2B5EF4-FFF2-40B4-BE49-F238E27FC236}">
+                <a16:creationId xmlns:a16="http://schemas.microsoft.com/office/drawing/2014/main" id="{D91C941C-8D5E-44F3-841B-50F010603663}"/>
+              </a:ext>
+            </a:extLst>
+          </p:cNvPr>
+          <p:cNvSpPr>
+            <a:spLocks noGrp="1"/>
+          </p:cNvSpPr>
+          <p:nvPr>
+            <p:ph type="sldNum" idx="12"/>
+          </p:nvPr>
+        </p:nvSpPr>
+        <p:spPr/>
+        <p:txBody>
+          <a:bodyPr/>
+          <a:lstStyle/>
+          <a:p>
+            <a:pPr marL="0" lvl="0" indent="0" algn="r" rtl="0">
+              <a:spcBef>
+                <a:spcPts val="0"/>
+              </a:spcBef>
+              <a:spcAft>
+                <a:spcPts val="0"/>
+              </a:spcAft>
+              <a:buNone/>
+            </a:pPr>
+            <a:fld id="{00000000-1234-1234-1234-123412341234}" type="slidenum">
+              <a:rPr lang="en" smtClean="0"/>
+              <a:t>32</a:t>
+            </a:fld>
+            <a:endParaRPr lang="en"/>
+          </a:p>
+        </p:txBody>
+      </p:sp>
+    </p:spTree>
+    <p:extLst>
+      <p:ext uri="{BB962C8B-B14F-4D97-AF65-F5344CB8AC3E}">
+        <p14:creationId xmlns:p14="http://schemas.microsoft.com/office/powerpoint/2010/main" val="501994175"/>
+      </p:ext>
+    </p:extLst>
+  </p:cSld>
+  <p:clrMapOvr>
+    <a:masterClrMapping/>
+  </p:clrMapOvr>
+</p:sld>
+</file>
+
+<file path=ppt/slides/slide33.xml><?xml version="1.0" encoding="utf-8"?>
 <p:sld xmlns:a="http://schemas.openxmlformats.org/drawingml/2006/main" xmlns:r="http://schemas.openxmlformats.org/officeDocument/2006/relationships" xmlns:p="http://schemas.openxmlformats.org/presentationml/2006/main">
   <p:cSld>
     <p:spTree>
@@ -15664,7 +16144,7 @@
             </a:pPr>
             <a:fld id="{00000000-1234-1234-1234-123412341234}" type="slidenum">
               <a:rPr lang="en" smtClean="0"/>
-              <a:t>32</a:t>
+              <a:t>33</a:t>
             </a:fld>
             <a:endParaRPr lang="en"/>
           </a:p>
@@ -15683,7 +16163,7 @@
 </p:sld>
 </file>
 
-<file path=ppt/slides/slide33.xml><?xml version="1.0" encoding="utf-8"?>
+<file path=ppt/slides/slide34.xml><?xml version="1.0" encoding="utf-8"?>
 <p:sld xmlns:a="http://schemas.openxmlformats.org/drawingml/2006/main" xmlns:r="http://schemas.openxmlformats.org/officeDocument/2006/relationships" xmlns:p="http://schemas.openxmlformats.org/presentationml/2006/main">
   <p:cSld>
     <p:spTree>
@@ -15983,7 +16463,7 @@
             </a:pPr>
             <a:fld id="{00000000-1234-1234-1234-123412341234}" type="slidenum">
               <a:rPr lang="en" smtClean="0"/>
-              <a:t>33</a:t>
+              <a:t>34</a:t>
             </a:fld>
             <a:endParaRPr lang="en"/>
           </a:p>

</xml_diff>